<commit_message>
fixed docs, added more descriptions
</commit_message>
<xml_diff>
--- a/docs/source/metasim/tutorial/boshi-docs/Framework-Design.pptx
+++ b/docs/source/metasim/tutorial/boshi-docs/Framework-Design.pptx
@@ -120,12 +120,12 @@
   <p:extLst>
     <p:ext uri="{EFAFB233-063F-42B5-8137-9DF3F51BA10A}">
       <p15:sldGuideLst xmlns:p15="http://schemas.microsoft.com/office/powerpoint/2012/main">
-        <p15:guide id="1" orient="horz" pos="2152" userDrawn="1">
+        <p15:guide id="1" orient="horz" pos="2163" userDrawn="1">
           <p15:clr>
             <a:srgbClr val="A4A3A4"/>
           </p15:clr>
         </p15:guide>
-        <p15:guide id="2" pos="3840" userDrawn="1">
+        <p15:guide id="2" pos="3846" userDrawn="1">
           <p15:clr>
             <a:srgbClr val="A4A3A4"/>
           </p15:clr>
@@ -8620,37 +8620,1535 @@
       <p:grpSpPr/>
       <p:sp>
         <p:nvSpPr>
-          <p:cNvPr id="2" name="Title 1"/>
-          <p:cNvSpPr>
-            <a:spLocks noGrp="1"/>
-          </p:cNvSpPr>
-          <p:nvPr>
-            <p:ph type="title"/>
-          </p:nvPr>
-        </p:nvSpPr>
-        <p:spPr/>
-        <p:txBody>
-          <a:bodyPr/>
-          <a:p>
+          <p:cNvPr id="8" name="Rectangles 7"/>
+          <p:cNvSpPr/>
+          <p:nvPr>
+            <p:custDataLst>
+              <p:tags r:id="rId1"/>
+            </p:custDataLst>
+          </p:nvPr>
+        </p:nvSpPr>
+        <p:spPr>
+          <a:xfrm>
+            <a:off x="1130300" y="205105"/>
+            <a:ext cx="9949815" cy="5922645"/>
+          </a:xfrm>
+          <a:prstGeom prst="rect">
+            <a:avLst/>
+          </a:prstGeom>
+          <a:solidFill>
+            <a:schemeClr val="accent4">
+              <a:lumMod val="75000"/>
+            </a:schemeClr>
+          </a:solidFill>
+          <a:ln>
+            <a:solidFill>
+              <a:schemeClr val="tx1"/>
+            </a:solidFill>
+          </a:ln>
+        </p:spPr>
+        <p:style>
+          <a:lnRef idx="2">
+            <a:schemeClr val="accent1">
+              <a:lumMod val="75000"/>
+            </a:schemeClr>
+          </a:lnRef>
+          <a:fillRef idx="1">
+            <a:schemeClr val="accent1"/>
+          </a:fillRef>
+          <a:effectRef idx="0">
+            <a:srgbClr val="FFFFFF"/>
+          </a:effectRef>
+          <a:fontRef idx="minor">
+            <a:schemeClr val="lt1"/>
+          </a:fontRef>
+        </p:style>
+        <p:txBody>
+          <a:bodyPr rtlCol="0" anchor="t" anchorCtr="0"/>
+          <a:p>
+            <a:pPr algn="ctr"/>
+            <a:r>
+              <a:rPr lang="en-US"/>
+              <a:t>RL Env Wrapper</a:t>
+            </a:r>
             <a:endParaRPr lang="en-US"/>
           </a:p>
         </p:txBody>
       </p:sp>
       <p:sp>
         <p:nvSpPr>
-          <p:cNvPr id="3" name="Content Placeholder 2"/>
-          <p:cNvSpPr>
-            <a:spLocks noGrp="1"/>
-          </p:cNvSpPr>
-          <p:nvPr>
-            <p:ph idx="1"/>
-          </p:nvPr>
-        </p:nvSpPr>
-        <p:spPr/>
-        <p:txBody>
-          <a:bodyPr/>
-          <a:p>
+          <p:cNvPr id="7" name="Rectangles 6"/>
+          <p:cNvSpPr/>
+          <p:nvPr>
+            <p:custDataLst>
+              <p:tags r:id="rId2"/>
+            </p:custDataLst>
+          </p:nvPr>
+        </p:nvSpPr>
+        <p:spPr>
+          <a:xfrm>
+            <a:off x="1498600" y="661670"/>
+            <a:ext cx="7593330" cy="5192395"/>
+          </a:xfrm>
+          <a:prstGeom prst="rect">
+            <a:avLst/>
+          </a:prstGeom>
+          <a:solidFill>
+            <a:schemeClr val="accent2">
+              <a:lumMod val="60000"/>
+              <a:lumOff val="40000"/>
+            </a:schemeClr>
+          </a:solidFill>
+          <a:ln>
+            <a:solidFill>
+              <a:schemeClr val="tx1"/>
+            </a:solidFill>
+          </a:ln>
+        </p:spPr>
+        <p:style>
+          <a:lnRef idx="2">
+            <a:schemeClr val="accent1">
+              <a:lumMod val="75000"/>
+            </a:schemeClr>
+          </a:lnRef>
+          <a:fillRef idx="1">
+            <a:schemeClr val="accent1"/>
+          </a:fillRef>
+          <a:effectRef idx="0">
+            <a:srgbClr val="FFFFFF"/>
+          </a:effectRef>
+          <a:fontRef idx="minor">
+            <a:schemeClr val="lt1"/>
+          </a:fontRef>
+        </p:style>
+        <p:txBody>
+          <a:bodyPr rtlCol="0" anchor="t" anchorCtr="0"/>
+          <a:p>
+            <a:pPr algn="ctr"/>
+            <a:r>
+              <a:rPr lang="en-US"/>
+              <a:t>Domain Randomizer</a:t>
+            </a:r>
             <a:endParaRPr lang="en-US"/>
+          </a:p>
+        </p:txBody>
+      </p:sp>
+      <p:sp>
+        <p:nvSpPr>
+          <p:cNvPr id="14" name="Rectangles 13"/>
+          <p:cNvSpPr/>
+          <p:nvPr>
+            <p:custDataLst>
+              <p:tags r:id="rId3"/>
+            </p:custDataLst>
+          </p:nvPr>
+        </p:nvSpPr>
+        <p:spPr>
+          <a:xfrm>
+            <a:off x="1886585" y="1101090"/>
+            <a:ext cx="5165725" cy="4455795"/>
+          </a:xfrm>
+          <a:prstGeom prst="rect">
+            <a:avLst/>
+          </a:prstGeom>
+          <a:ln>
+            <a:solidFill>
+              <a:schemeClr val="tx1"/>
+            </a:solidFill>
+          </a:ln>
+        </p:spPr>
+        <p:style>
+          <a:lnRef idx="2">
+            <a:schemeClr val="accent1">
+              <a:lumMod val="75000"/>
+            </a:schemeClr>
+          </a:lnRef>
+          <a:fillRef idx="1">
+            <a:schemeClr val="accent1"/>
+          </a:fillRef>
+          <a:effectRef idx="0">
+            <a:srgbClr val="FFFFFF"/>
+          </a:effectRef>
+          <a:fontRef idx="minor">
+            <a:schemeClr val="lt1"/>
+          </a:fontRef>
+        </p:style>
+        <p:txBody>
+          <a:bodyPr rtlCol="0" anchor="t" anchorCtr="0"/>
+          <a:p>
+            <a:pPr algn="ctr"/>
+            <a:r>
+              <a:rPr lang="en-US"/>
+              <a:t>Task Wrapper</a:t>
+            </a:r>
+            <a:endParaRPr lang="en-US"/>
+          </a:p>
+        </p:txBody>
+      </p:sp>
+      <p:sp>
+        <p:nvSpPr>
+          <p:cNvPr id="15" name="Rectangles 14"/>
+          <p:cNvSpPr/>
+          <p:nvPr>
+            <p:custDataLst>
+              <p:tags r:id="rId4"/>
+            </p:custDataLst>
+          </p:nvPr>
+        </p:nvSpPr>
+        <p:spPr>
+          <a:xfrm>
+            <a:off x="2373630" y="1799590"/>
+            <a:ext cx="2433320" cy="2854960"/>
+          </a:xfrm>
+          <a:prstGeom prst="rect">
+            <a:avLst/>
+          </a:prstGeom>
+          <a:solidFill>
+            <a:schemeClr val="accent2"/>
+          </a:solidFill>
+        </p:spPr>
+        <p:style>
+          <a:lnRef idx="2">
+            <a:schemeClr val="accent1">
+              <a:lumMod val="75000"/>
+            </a:schemeClr>
+          </a:lnRef>
+          <a:fillRef idx="1">
+            <a:schemeClr val="accent1"/>
+          </a:fillRef>
+          <a:effectRef idx="0">
+            <a:srgbClr val="FFFFFF"/>
+          </a:effectRef>
+          <a:fontRef idx="minor">
+            <a:schemeClr val="lt1"/>
+          </a:fontRef>
+        </p:style>
+        <p:txBody>
+          <a:bodyPr rtlCol="0" anchor="t" anchorCtr="0"/>
+          <a:p>
+            <a:pPr algn="ctr"/>
+            <a:r>
+              <a:rPr lang="en-US"/>
+              <a:t>Handler</a:t>
+            </a:r>
+            <a:endParaRPr lang="en-US"/>
+          </a:p>
+        </p:txBody>
+      </p:sp>
+      <p:sp>
+        <p:nvSpPr>
+          <p:cNvPr id="16" name="Rounded Rectangle 15"/>
+          <p:cNvSpPr/>
+          <p:nvPr>
+            <p:custDataLst>
+              <p:tags r:id="rId5"/>
+            </p:custDataLst>
+          </p:nvPr>
+        </p:nvSpPr>
+        <p:spPr>
+          <a:xfrm>
+            <a:off x="2774950" y="2226945"/>
+            <a:ext cx="1661160" cy="428625"/>
+          </a:xfrm>
+          <a:prstGeom prst="roundRect">
+            <a:avLst/>
+          </a:prstGeom>
+          <a:solidFill>
+            <a:schemeClr val="accent6">
+              <a:lumMod val="60000"/>
+              <a:lumOff val="40000"/>
+            </a:schemeClr>
+          </a:solidFill>
+        </p:spPr>
+        <p:style>
+          <a:lnRef idx="2">
+            <a:schemeClr val="accent1">
+              <a:lumMod val="75000"/>
+            </a:schemeClr>
+          </a:lnRef>
+          <a:fillRef idx="1">
+            <a:schemeClr val="accent1"/>
+          </a:fillRef>
+          <a:effectRef idx="0">
+            <a:srgbClr val="FFFFFF"/>
+          </a:effectRef>
+          <a:fontRef idx="minor">
+            <a:schemeClr val="lt1"/>
+          </a:fontRef>
+        </p:style>
+        <p:txBody>
+          <a:bodyPr rtlCol="0" anchor="ctr"/>
+          <a:p>
+            <a:pPr algn="ctr"/>
+            <a:r>
+              <a:rPr lang="en-US"/>
+              <a:t>set_state()</a:t>
+            </a:r>
+            <a:endParaRPr lang="en-US"/>
+          </a:p>
+        </p:txBody>
+      </p:sp>
+      <p:sp>
+        <p:nvSpPr>
+          <p:cNvPr id="17" name="Rounded Rectangle 16"/>
+          <p:cNvSpPr/>
+          <p:nvPr>
+            <p:custDataLst>
+              <p:tags r:id="rId6"/>
+            </p:custDataLst>
+          </p:nvPr>
+        </p:nvSpPr>
+        <p:spPr>
+          <a:xfrm>
+            <a:off x="2774950" y="2744470"/>
+            <a:ext cx="1661160" cy="427990"/>
+          </a:xfrm>
+          <a:prstGeom prst="roundRect">
+            <a:avLst/>
+          </a:prstGeom>
+          <a:solidFill>
+            <a:schemeClr val="accent6">
+              <a:lumMod val="60000"/>
+              <a:lumOff val="40000"/>
+            </a:schemeClr>
+          </a:solidFill>
+        </p:spPr>
+        <p:style>
+          <a:lnRef idx="2">
+            <a:schemeClr val="accent1">
+              <a:lumMod val="75000"/>
+            </a:schemeClr>
+          </a:lnRef>
+          <a:fillRef idx="1">
+            <a:schemeClr val="accent1"/>
+          </a:fillRef>
+          <a:effectRef idx="0">
+            <a:srgbClr val="FFFFFF"/>
+          </a:effectRef>
+          <a:fontRef idx="minor">
+            <a:schemeClr val="lt1"/>
+          </a:fontRef>
+        </p:style>
+        <p:txBody>
+          <a:bodyPr rtlCol="0" anchor="ctr"/>
+          <a:p>
+            <a:pPr algn="ctr"/>
+            <a:r>
+              <a:rPr lang="en-US"/>
+              <a:t>get_state()</a:t>
+            </a:r>
+            <a:endParaRPr lang="en-US"/>
+          </a:p>
+        </p:txBody>
+      </p:sp>
+      <p:sp>
+        <p:nvSpPr>
+          <p:cNvPr id="19" name="Rounded Rectangle 18"/>
+          <p:cNvSpPr/>
+          <p:nvPr>
+            <p:custDataLst>
+              <p:tags r:id="rId7"/>
+            </p:custDataLst>
+          </p:nvPr>
+        </p:nvSpPr>
+        <p:spPr>
+          <a:xfrm>
+            <a:off x="2774950" y="3778250"/>
+            <a:ext cx="1661160" cy="427990"/>
+          </a:xfrm>
+          <a:prstGeom prst="roundRect">
+            <a:avLst/>
+          </a:prstGeom>
+          <a:solidFill>
+            <a:schemeClr val="accent6">
+              <a:lumMod val="60000"/>
+              <a:lumOff val="40000"/>
+            </a:schemeClr>
+          </a:solidFill>
+        </p:spPr>
+        <p:style>
+          <a:lnRef idx="2">
+            <a:schemeClr val="accent1">
+              <a:lumMod val="75000"/>
+            </a:schemeClr>
+          </a:lnRef>
+          <a:fillRef idx="1">
+            <a:schemeClr val="accent1"/>
+          </a:fillRef>
+          <a:effectRef idx="0">
+            <a:srgbClr val="FFFFFF"/>
+          </a:effectRef>
+          <a:fontRef idx="minor">
+            <a:schemeClr val="lt1"/>
+          </a:fontRef>
+        </p:style>
+        <p:txBody>
+          <a:bodyPr rtlCol="0" anchor="ctr"/>
+          <a:p>
+            <a:pPr algn="ctr"/>
+            <a:r>
+              <a:rPr lang="en-US"/>
+              <a:t>get_extra()</a:t>
+            </a:r>
+            <a:endParaRPr lang="en-US"/>
+          </a:p>
+        </p:txBody>
+      </p:sp>
+      <p:sp>
+        <p:nvSpPr>
+          <p:cNvPr id="22" name="Rounded Rectangle 21"/>
+          <p:cNvSpPr/>
+          <p:nvPr>
+            <p:custDataLst>
+              <p:tags r:id="rId8"/>
+            </p:custDataLst>
+          </p:nvPr>
+        </p:nvSpPr>
+        <p:spPr>
+          <a:xfrm>
+            <a:off x="5123180" y="1790700"/>
+            <a:ext cx="1661160" cy="436245"/>
+          </a:xfrm>
+          <a:prstGeom prst="roundRect">
+            <a:avLst/>
+          </a:prstGeom>
+          <a:solidFill>
+            <a:schemeClr val="accent6">
+              <a:lumMod val="60000"/>
+              <a:lumOff val="40000"/>
+            </a:schemeClr>
+          </a:solidFill>
+        </p:spPr>
+        <p:style>
+          <a:lnRef idx="2">
+            <a:schemeClr val="accent1">
+              <a:lumMod val="75000"/>
+            </a:schemeClr>
+          </a:lnRef>
+          <a:fillRef idx="1">
+            <a:schemeClr val="accent1"/>
+          </a:fillRef>
+          <a:effectRef idx="0">
+            <a:srgbClr val="FFFFFF"/>
+          </a:effectRef>
+          <a:fontRef idx="minor">
+            <a:schemeClr val="lt1"/>
+          </a:fontRef>
+        </p:style>
+        <p:txBody>
+          <a:bodyPr rtlCol="0" anchor="ctr"/>
+          <a:p>
+            <a:pPr algn="ctr"/>
+            <a:r>
+              <a:rPr lang="en-US"/>
+              <a:t>step()</a:t>
+            </a:r>
+            <a:endParaRPr lang="en-US"/>
+          </a:p>
+        </p:txBody>
+      </p:sp>
+      <p:sp>
+        <p:nvSpPr>
+          <p:cNvPr id="23" name="Rounded Rectangle 22"/>
+          <p:cNvSpPr/>
+          <p:nvPr>
+            <p:custDataLst>
+              <p:tags r:id="rId9"/>
+            </p:custDataLst>
+          </p:nvPr>
+        </p:nvSpPr>
+        <p:spPr>
+          <a:xfrm>
+            <a:off x="5123180" y="2446655"/>
+            <a:ext cx="1661160" cy="436245"/>
+          </a:xfrm>
+          <a:prstGeom prst="roundRect">
+            <a:avLst/>
+          </a:prstGeom>
+          <a:solidFill>
+            <a:schemeClr val="accent6">
+              <a:lumMod val="60000"/>
+              <a:lumOff val="40000"/>
+            </a:schemeClr>
+          </a:solidFill>
+        </p:spPr>
+        <p:style>
+          <a:lnRef idx="2">
+            <a:schemeClr val="accent1">
+              <a:lumMod val="75000"/>
+            </a:schemeClr>
+          </a:lnRef>
+          <a:fillRef idx="1">
+            <a:schemeClr val="accent1"/>
+          </a:fillRef>
+          <a:effectRef idx="0">
+            <a:srgbClr val="FFFFFF"/>
+          </a:effectRef>
+          <a:fontRef idx="minor">
+            <a:schemeClr val="lt1"/>
+          </a:fontRef>
+        </p:style>
+        <p:txBody>
+          <a:bodyPr rtlCol="0" anchor="ctr"/>
+          <a:p>
+            <a:pPr algn="ctr"/>
+            <a:r>
+              <a:rPr lang="en-US"/>
+              <a:t>reset()</a:t>
+            </a:r>
+            <a:endParaRPr lang="en-US"/>
+          </a:p>
+        </p:txBody>
+      </p:sp>
+      <p:sp>
+        <p:nvSpPr>
+          <p:cNvPr id="24" name="Rounded Rectangle 23"/>
+          <p:cNvSpPr/>
+          <p:nvPr>
+            <p:custDataLst>
+              <p:tags r:id="rId10"/>
+            </p:custDataLst>
+          </p:nvPr>
+        </p:nvSpPr>
+        <p:spPr>
+          <a:xfrm>
+            <a:off x="5123180" y="3102610"/>
+            <a:ext cx="1660525" cy="427355"/>
+          </a:xfrm>
+          <a:prstGeom prst="roundRect">
+            <a:avLst/>
+          </a:prstGeom>
+          <a:solidFill>
+            <a:schemeClr val="accent6">
+              <a:lumMod val="60000"/>
+              <a:lumOff val="40000"/>
+            </a:schemeClr>
+          </a:solidFill>
+        </p:spPr>
+        <p:style>
+          <a:lnRef idx="2">
+            <a:schemeClr val="accent1">
+              <a:lumMod val="75000"/>
+            </a:schemeClr>
+          </a:lnRef>
+          <a:fillRef idx="1">
+            <a:schemeClr val="accent1"/>
+          </a:fillRef>
+          <a:effectRef idx="0">
+            <a:srgbClr val="FFFFFF"/>
+          </a:effectRef>
+          <a:fontRef idx="minor">
+            <a:schemeClr val="lt1"/>
+          </a:fontRef>
+        </p:style>
+        <p:txBody>
+          <a:bodyPr rtlCol="0" anchor="ctr"/>
+          <a:p>
+            <a:pPr algn="ctr"/>
+            <a:r>
+              <a:rPr lang="en-US"/>
+              <a:t>_reward()</a:t>
+            </a:r>
+            <a:endParaRPr lang="en-US"/>
+          </a:p>
+        </p:txBody>
+      </p:sp>
+      <p:sp>
+        <p:nvSpPr>
+          <p:cNvPr id="25" name="Rounded Rectangle 24"/>
+          <p:cNvSpPr/>
+          <p:nvPr>
+            <p:custDataLst>
+              <p:tags r:id="rId11"/>
+            </p:custDataLst>
+          </p:nvPr>
+        </p:nvSpPr>
+        <p:spPr>
+          <a:xfrm>
+            <a:off x="5123180" y="3749675"/>
+            <a:ext cx="1660525" cy="427355"/>
+          </a:xfrm>
+          <a:prstGeom prst="roundRect">
+            <a:avLst/>
+          </a:prstGeom>
+          <a:solidFill>
+            <a:schemeClr val="accent6">
+              <a:lumMod val="60000"/>
+              <a:lumOff val="40000"/>
+            </a:schemeClr>
+          </a:solidFill>
+        </p:spPr>
+        <p:style>
+          <a:lnRef idx="2">
+            <a:schemeClr val="accent1">
+              <a:lumMod val="75000"/>
+            </a:schemeClr>
+          </a:lnRef>
+          <a:fillRef idx="1">
+            <a:schemeClr val="accent1"/>
+          </a:fillRef>
+          <a:effectRef idx="0">
+            <a:srgbClr val="FFFFFF"/>
+          </a:effectRef>
+          <a:fontRef idx="minor">
+            <a:schemeClr val="lt1"/>
+          </a:fontRef>
+        </p:style>
+        <p:txBody>
+          <a:bodyPr rtlCol="0" anchor="ctr"/>
+          <a:p>
+            <a:pPr algn="ctr"/>
+            <a:r>
+              <a:rPr lang="en-US"/>
+              <a:t>_observation()</a:t>
+            </a:r>
+            <a:endParaRPr lang="en-US"/>
+          </a:p>
+        </p:txBody>
+      </p:sp>
+      <p:sp>
+        <p:nvSpPr>
+          <p:cNvPr id="26" name="Rounded Rectangle 25"/>
+          <p:cNvSpPr/>
+          <p:nvPr>
+            <p:custDataLst>
+              <p:tags r:id="rId12"/>
+            </p:custDataLst>
+          </p:nvPr>
+        </p:nvSpPr>
+        <p:spPr>
+          <a:xfrm>
+            <a:off x="5123180" y="4396740"/>
+            <a:ext cx="1660525" cy="427355"/>
+          </a:xfrm>
+          <a:prstGeom prst="roundRect">
+            <a:avLst/>
+          </a:prstGeom>
+          <a:solidFill>
+            <a:schemeClr val="accent6">
+              <a:lumMod val="60000"/>
+              <a:lumOff val="40000"/>
+            </a:schemeClr>
+          </a:solidFill>
+        </p:spPr>
+        <p:style>
+          <a:lnRef idx="2">
+            <a:schemeClr val="accent1">
+              <a:lumMod val="75000"/>
+            </a:schemeClr>
+          </a:lnRef>
+          <a:fillRef idx="1">
+            <a:schemeClr val="accent1"/>
+          </a:fillRef>
+          <a:effectRef idx="0">
+            <a:srgbClr val="FFFFFF"/>
+          </a:effectRef>
+          <a:fontRef idx="minor">
+            <a:schemeClr val="lt1"/>
+          </a:fontRef>
+        </p:style>
+        <p:txBody>
+          <a:bodyPr rtlCol="0" anchor="ctr"/>
+          <a:p>
+            <a:pPr algn="ctr"/>
+            <a:r>
+              <a:rPr lang="en-US" altLang="zh-CN"/>
+              <a:t>_success()</a:t>
+            </a:r>
+            <a:endParaRPr lang="en-US" altLang="zh-CN"/>
+          </a:p>
+        </p:txBody>
+      </p:sp>
+      <p:sp>
+        <p:nvSpPr>
+          <p:cNvPr id="4" name="Oval 3"/>
+          <p:cNvSpPr/>
+          <p:nvPr/>
+        </p:nvSpPr>
+        <p:spPr>
+          <a:xfrm>
+            <a:off x="3521075" y="3308350"/>
+            <a:ext cx="75565" cy="75565"/>
+          </a:xfrm>
+          <a:prstGeom prst="ellipse">
+            <a:avLst/>
+          </a:prstGeom>
+        </p:spPr>
+        <p:style>
+          <a:lnRef idx="2">
+            <a:schemeClr val="accent1">
+              <a:lumMod val="75000"/>
+            </a:schemeClr>
+          </a:lnRef>
+          <a:fillRef idx="1">
+            <a:schemeClr val="accent1"/>
+          </a:fillRef>
+          <a:effectRef idx="0">
+            <a:srgbClr val="FFFFFF"/>
+          </a:effectRef>
+          <a:fontRef idx="minor">
+            <a:schemeClr val="lt1"/>
+          </a:fontRef>
+        </p:style>
+        <p:txBody>
+          <a:bodyPr rtlCol="0" anchor="ctr"/>
+          <a:p>
+            <a:pPr algn="ctr"/>
+            <a:endParaRPr lang="en-US"/>
+          </a:p>
+        </p:txBody>
+      </p:sp>
+      <p:sp>
+        <p:nvSpPr>
+          <p:cNvPr id="5" name="Oval 4"/>
+          <p:cNvSpPr/>
+          <p:nvPr>
+            <p:custDataLst>
+              <p:tags r:id="rId13"/>
+            </p:custDataLst>
+          </p:nvPr>
+        </p:nvSpPr>
+        <p:spPr>
+          <a:xfrm>
+            <a:off x="3521075" y="3441700"/>
+            <a:ext cx="75565" cy="75565"/>
+          </a:xfrm>
+          <a:prstGeom prst="ellipse">
+            <a:avLst/>
+          </a:prstGeom>
+        </p:spPr>
+        <p:style>
+          <a:lnRef idx="2">
+            <a:schemeClr val="accent1">
+              <a:lumMod val="75000"/>
+            </a:schemeClr>
+          </a:lnRef>
+          <a:fillRef idx="1">
+            <a:schemeClr val="accent1"/>
+          </a:fillRef>
+          <a:effectRef idx="0">
+            <a:srgbClr val="FFFFFF"/>
+          </a:effectRef>
+          <a:fontRef idx="minor">
+            <a:schemeClr val="lt1"/>
+          </a:fontRef>
+        </p:style>
+        <p:txBody>
+          <a:bodyPr rtlCol="0" anchor="ctr"/>
+          <a:p>
+            <a:pPr algn="ctr"/>
+            <a:endParaRPr lang="en-US"/>
+          </a:p>
+        </p:txBody>
+      </p:sp>
+      <p:sp>
+        <p:nvSpPr>
+          <p:cNvPr id="6" name="Oval 5"/>
+          <p:cNvSpPr/>
+          <p:nvPr>
+            <p:custDataLst>
+              <p:tags r:id="rId14"/>
+            </p:custDataLst>
+          </p:nvPr>
+        </p:nvSpPr>
+        <p:spPr>
+          <a:xfrm>
+            <a:off x="3521075" y="3568700"/>
+            <a:ext cx="75565" cy="75565"/>
+          </a:xfrm>
+          <a:prstGeom prst="ellipse">
+            <a:avLst/>
+          </a:prstGeom>
+        </p:spPr>
+        <p:style>
+          <a:lnRef idx="2">
+            <a:schemeClr val="accent1">
+              <a:lumMod val="75000"/>
+            </a:schemeClr>
+          </a:lnRef>
+          <a:fillRef idx="1">
+            <a:schemeClr val="accent1"/>
+          </a:fillRef>
+          <a:effectRef idx="0">
+            <a:srgbClr val="FFFFFF"/>
+          </a:effectRef>
+          <a:fontRef idx="minor">
+            <a:schemeClr val="lt1"/>
+          </a:fontRef>
+        </p:style>
+        <p:txBody>
+          <a:bodyPr rtlCol="0" anchor="ctr"/>
+          <a:p>
+            <a:pPr algn="ctr"/>
+            <a:endParaRPr lang="en-US"/>
+          </a:p>
+        </p:txBody>
+      </p:sp>
+      <p:sp>
+        <p:nvSpPr>
+          <p:cNvPr id="10" name="Rounded Rectangle 9"/>
+          <p:cNvSpPr/>
+          <p:nvPr>
+            <p:custDataLst>
+              <p:tags r:id="rId15"/>
+            </p:custDataLst>
+          </p:nvPr>
+        </p:nvSpPr>
+        <p:spPr>
+          <a:xfrm>
+            <a:off x="7279005" y="1790700"/>
+            <a:ext cx="1661160" cy="436245"/>
+          </a:xfrm>
+          <a:prstGeom prst="roundRect">
+            <a:avLst/>
+          </a:prstGeom>
+          <a:solidFill>
+            <a:schemeClr val="accent6">
+              <a:lumMod val="60000"/>
+              <a:lumOff val="40000"/>
+            </a:schemeClr>
+          </a:solidFill>
+        </p:spPr>
+        <p:style>
+          <a:lnRef idx="2">
+            <a:schemeClr val="accent1">
+              <a:lumMod val="75000"/>
+            </a:schemeClr>
+          </a:lnRef>
+          <a:fillRef idx="1">
+            <a:schemeClr val="accent1"/>
+          </a:fillRef>
+          <a:effectRef idx="0">
+            <a:srgbClr val="FFFFFF"/>
+          </a:effectRef>
+          <a:fontRef idx="minor">
+            <a:schemeClr val="lt1"/>
+          </a:fontRef>
+        </p:style>
+        <p:txBody>
+          <a:bodyPr rtlCol="0" anchor="ctr"/>
+          <a:p>
+            <a:pPr algn="ctr"/>
+            <a:r>
+              <a:rPr lang="en-US"/>
+              <a:t>step()</a:t>
+            </a:r>
+            <a:endParaRPr lang="en-US"/>
+          </a:p>
+        </p:txBody>
+      </p:sp>
+      <p:sp>
+        <p:nvSpPr>
+          <p:cNvPr id="11" name="Rounded Rectangle 10"/>
+          <p:cNvSpPr/>
+          <p:nvPr>
+            <p:custDataLst>
+              <p:tags r:id="rId16"/>
+            </p:custDataLst>
+          </p:nvPr>
+        </p:nvSpPr>
+        <p:spPr>
+          <a:xfrm>
+            <a:off x="7279005" y="2446655"/>
+            <a:ext cx="1661160" cy="436245"/>
+          </a:xfrm>
+          <a:prstGeom prst="roundRect">
+            <a:avLst/>
+          </a:prstGeom>
+          <a:solidFill>
+            <a:schemeClr val="accent6">
+              <a:lumMod val="60000"/>
+              <a:lumOff val="40000"/>
+            </a:schemeClr>
+          </a:solidFill>
+        </p:spPr>
+        <p:style>
+          <a:lnRef idx="2">
+            <a:schemeClr val="accent1">
+              <a:lumMod val="75000"/>
+            </a:schemeClr>
+          </a:lnRef>
+          <a:fillRef idx="1">
+            <a:schemeClr val="accent1"/>
+          </a:fillRef>
+          <a:effectRef idx="0">
+            <a:srgbClr val="FFFFFF"/>
+          </a:effectRef>
+          <a:fontRef idx="minor">
+            <a:schemeClr val="lt1"/>
+          </a:fontRef>
+        </p:style>
+        <p:txBody>
+          <a:bodyPr rtlCol="0" anchor="ctr"/>
+          <a:p>
+            <a:pPr algn="ctr"/>
+            <a:r>
+              <a:rPr lang="en-US"/>
+              <a:t>reset()</a:t>
+            </a:r>
+            <a:endParaRPr lang="en-US"/>
+          </a:p>
+        </p:txBody>
+      </p:sp>
+      <p:sp>
+        <p:nvSpPr>
+          <p:cNvPr id="12" name="Rounded Rectangle 11"/>
+          <p:cNvSpPr/>
+          <p:nvPr>
+            <p:custDataLst>
+              <p:tags r:id="rId17"/>
+            </p:custDataLst>
+          </p:nvPr>
+        </p:nvSpPr>
+        <p:spPr>
+          <a:xfrm>
+            <a:off x="9255760" y="1799590"/>
+            <a:ext cx="1661160" cy="436245"/>
+          </a:xfrm>
+          <a:prstGeom prst="roundRect">
+            <a:avLst/>
+          </a:prstGeom>
+          <a:solidFill>
+            <a:schemeClr val="accent6">
+              <a:lumMod val="60000"/>
+              <a:lumOff val="40000"/>
+            </a:schemeClr>
+          </a:solidFill>
+        </p:spPr>
+        <p:style>
+          <a:lnRef idx="2">
+            <a:schemeClr val="accent1">
+              <a:lumMod val="75000"/>
+            </a:schemeClr>
+          </a:lnRef>
+          <a:fillRef idx="1">
+            <a:schemeClr val="accent1"/>
+          </a:fillRef>
+          <a:effectRef idx="0">
+            <a:srgbClr val="FFFFFF"/>
+          </a:effectRef>
+          <a:fontRef idx="minor">
+            <a:schemeClr val="lt1"/>
+          </a:fontRef>
+        </p:style>
+        <p:txBody>
+          <a:bodyPr rtlCol="0" anchor="ctr"/>
+          <a:p>
+            <a:pPr algn="ctr"/>
+            <a:r>
+              <a:rPr lang="en-US"/>
+              <a:t>step()</a:t>
+            </a:r>
+            <a:endParaRPr lang="en-US"/>
+          </a:p>
+        </p:txBody>
+      </p:sp>
+      <p:sp>
+        <p:nvSpPr>
+          <p:cNvPr id="13" name="Rounded Rectangle 12"/>
+          <p:cNvSpPr/>
+          <p:nvPr>
+            <p:custDataLst>
+              <p:tags r:id="rId18"/>
+            </p:custDataLst>
+          </p:nvPr>
+        </p:nvSpPr>
+        <p:spPr>
+          <a:xfrm>
+            <a:off x="9255760" y="2446655"/>
+            <a:ext cx="1661160" cy="436245"/>
+          </a:xfrm>
+          <a:prstGeom prst="roundRect">
+            <a:avLst/>
+          </a:prstGeom>
+          <a:solidFill>
+            <a:schemeClr val="accent6">
+              <a:lumMod val="60000"/>
+              <a:lumOff val="40000"/>
+            </a:schemeClr>
+          </a:solidFill>
+        </p:spPr>
+        <p:style>
+          <a:lnRef idx="2">
+            <a:schemeClr val="accent1">
+              <a:lumMod val="75000"/>
+            </a:schemeClr>
+          </a:lnRef>
+          <a:fillRef idx="1">
+            <a:schemeClr val="accent1"/>
+          </a:fillRef>
+          <a:effectRef idx="0">
+            <a:srgbClr val="FFFFFF"/>
+          </a:effectRef>
+          <a:fontRef idx="minor">
+            <a:schemeClr val="lt1"/>
+          </a:fontRef>
+        </p:style>
+        <p:txBody>
+          <a:bodyPr rtlCol="0" anchor="ctr"/>
+          <a:p>
+            <a:pPr algn="ctr"/>
+            <a:r>
+              <a:rPr lang="en-US"/>
+              <a:t>reset()</a:t>
+            </a:r>
+            <a:endParaRPr lang="en-US"/>
+          </a:p>
+        </p:txBody>
+      </p:sp>
+      <p:cxnSp>
+        <p:nvCxnSpPr>
+          <p:cNvPr id="18" name="Curved Connector 17"/>
+          <p:cNvCxnSpPr>
+            <a:stCxn id="11" idx="2"/>
+            <a:endCxn id="13" idx="2"/>
+          </p:cNvCxnSpPr>
+          <p:nvPr/>
+        </p:nvCxnSpPr>
+        <p:spPr>
+          <a:xfrm rot="5400000" flipV="1">
+            <a:off x="9097645" y="1894205"/>
+            <a:ext cx="3175" cy="1976755"/>
+          </a:xfrm>
+          <a:prstGeom prst="curvedConnector3">
+            <a:avLst>
+              <a:gd name="adj1" fmla="val 7540000"/>
+            </a:avLst>
+          </a:prstGeom>
+          <a:ln w="19050">
+            <a:solidFill>
+              <a:schemeClr val="tx1"/>
+            </a:solidFill>
+            <a:tailEnd type="arrow"/>
+          </a:ln>
+        </p:spPr>
+        <p:style>
+          <a:lnRef idx="2">
+            <a:schemeClr val="accent1"/>
+          </a:lnRef>
+          <a:fillRef idx="0">
+            <a:srgbClr val="FFFFFF"/>
+          </a:fillRef>
+          <a:effectRef idx="0">
+            <a:srgbClr val="FFFFFF"/>
+          </a:effectRef>
+          <a:fontRef idx="minor">
+            <a:schemeClr val="tx1"/>
+          </a:fontRef>
+        </p:style>
+      </p:cxnSp>
+      <p:cxnSp>
+        <p:nvCxnSpPr>
+          <p:cNvPr id="20" name="Curved Connector 19"/>
+          <p:cNvCxnSpPr>
+            <a:stCxn id="10" idx="2"/>
+            <a:endCxn id="12" idx="2"/>
+          </p:cNvCxnSpPr>
+          <p:nvPr>
+            <p:custDataLst>
+              <p:tags r:id="rId19"/>
+            </p:custDataLst>
+          </p:nvPr>
+        </p:nvCxnSpPr>
+        <p:spPr>
+          <a:xfrm rot="5400000" flipV="1">
+            <a:off x="9093200" y="1242695"/>
+            <a:ext cx="8890" cy="1976755"/>
+          </a:xfrm>
+          <a:prstGeom prst="curvedConnector3">
+            <a:avLst>
+              <a:gd name="adj1" fmla="val 2775000"/>
+            </a:avLst>
+          </a:prstGeom>
+          <a:ln w="19050">
+            <a:solidFill>
+              <a:schemeClr val="tx1"/>
+            </a:solidFill>
+            <a:tailEnd type="arrow"/>
+          </a:ln>
+        </p:spPr>
+        <p:style>
+          <a:lnRef idx="2">
+            <a:schemeClr val="accent1"/>
+          </a:lnRef>
+          <a:fillRef idx="0">
+            <a:srgbClr val="FFFFFF"/>
+          </a:fillRef>
+          <a:effectRef idx="0">
+            <a:srgbClr val="FFFFFF"/>
+          </a:effectRef>
+          <a:fontRef idx="minor">
+            <a:schemeClr val="tx1"/>
+          </a:fontRef>
+        </p:style>
+      </p:cxnSp>
+      <p:cxnSp>
+        <p:nvCxnSpPr>
+          <p:cNvPr id="28" name="Curved Connector 27"/>
+          <p:cNvCxnSpPr>
+            <a:stCxn id="22" idx="2"/>
+            <a:endCxn id="10" idx="2"/>
+          </p:cNvCxnSpPr>
+          <p:nvPr>
+            <p:custDataLst>
+              <p:tags r:id="rId20"/>
+            </p:custDataLst>
+          </p:nvPr>
+        </p:nvCxnSpPr>
+        <p:spPr>
+          <a:xfrm rot="5400000" flipV="1">
+            <a:off x="7031355" y="1148715"/>
+            <a:ext cx="3175" cy="2155825"/>
+          </a:xfrm>
+          <a:prstGeom prst="curvedConnector3">
+            <a:avLst>
+              <a:gd name="adj1" fmla="val 7540000"/>
+            </a:avLst>
+          </a:prstGeom>
+          <a:ln w="19050">
+            <a:solidFill>
+              <a:schemeClr val="tx1"/>
+            </a:solidFill>
+            <a:tailEnd type="arrow"/>
+          </a:ln>
+        </p:spPr>
+        <p:style>
+          <a:lnRef idx="2">
+            <a:schemeClr val="accent1"/>
+          </a:lnRef>
+          <a:fillRef idx="0">
+            <a:srgbClr val="FFFFFF"/>
+          </a:fillRef>
+          <a:effectRef idx="0">
+            <a:srgbClr val="FFFFFF"/>
+          </a:effectRef>
+          <a:fontRef idx="minor">
+            <a:schemeClr val="tx1"/>
+          </a:fontRef>
+        </p:style>
+      </p:cxnSp>
+      <p:cxnSp>
+        <p:nvCxnSpPr>
+          <p:cNvPr id="29" name="Curved Connector 28"/>
+          <p:cNvCxnSpPr>
+            <a:stCxn id="23" idx="2"/>
+            <a:endCxn id="11" idx="2"/>
+          </p:cNvCxnSpPr>
+          <p:nvPr>
+            <p:custDataLst>
+              <p:tags r:id="rId21"/>
+            </p:custDataLst>
+          </p:nvPr>
+        </p:nvCxnSpPr>
+        <p:spPr>
+          <a:xfrm rot="5400000" flipV="1">
+            <a:off x="7031355" y="1804670"/>
+            <a:ext cx="3175" cy="2155825"/>
+          </a:xfrm>
+          <a:prstGeom prst="curvedConnector3">
+            <a:avLst>
+              <a:gd name="adj1" fmla="val 7540000"/>
+            </a:avLst>
+          </a:prstGeom>
+          <a:ln w="19050">
+            <a:solidFill>
+              <a:schemeClr val="tx1"/>
+            </a:solidFill>
+            <a:tailEnd type="arrow"/>
+          </a:ln>
+        </p:spPr>
+        <p:style>
+          <a:lnRef idx="2">
+            <a:schemeClr val="accent1"/>
+          </a:lnRef>
+          <a:fillRef idx="0">
+            <a:srgbClr val="FFFFFF"/>
+          </a:fillRef>
+          <a:effectRef idx="0">
+            <a:srgbClr val="FFFFFF"/>
+          </a:effectRef>
+          <a:fontRef idx="minor">
+            <a:schemeClr val="tx1"/>
+          </a:fontRef>
+        </p:style>
+      </p:cxnSp>
+      <p:sp>
+        <p:nvSpPr>
+          <p:cNvPr id="31" name="Rounded Rectangle 30"/>
+          <p:cNvSpPr/>
+          <p:nvPr>
+            <p:custDataLst>
+              <p:tags r:id="rId22"/>
+            </p:custDataLst>
+          </p:nvPr>
+        </p:nvSpPr>
+        <p:spPr>
+          <a:xfrm>
+            <a:off x="7279005" y="3107055"/>
+            <a:ext cx="1661160" cy="436245"/>
+          </a:xfrm>
+          <a:prstGeom prst="roundRect">
+            <a:avLst/>
+          </a:prstGeom>
+          <a:solidFill>
+            <a:schemeClr val="accent6">
+              <a:lumMod val="60000"/>
+              <a:lumOff val="40000"/>
+            </a:schemeClr>
+          </a:solidFill>
+        </p:spPr>
+        <p:style>
+          <a:lnRef idx="2">
+            <a:schemeClr val="accent1">
+              <a:lumMod val="75000"/>
+            </a:schemeClr>
+          </a:lnRef>
+          <a:fillRef idx="1">
+            <a:schemeClr val="accent1"/>
+          </a:fillRef>
+          <a:effectRef idx="0">
+            <a:srgbClr val="FFFFFF"/>
+          </a:effectRef>
+          <a:fontRef idx="minor">
+            <a:schemeClr val="lt1"/>
+          </a:fontRef>
+        </p:style>
+        <p:txBody>
+          <a:bodyPr rtlCol="0" anchor="ctr"/>
+          <a:p>
+            <a:pPr algn="ctr"/>
+            <a:r>
+              <a:rPr lang="en-US"/>
+              <a:t>reset_hook()</a:t>
+            </a:r>
+            <a:endParaRPr lang="en-US"/>
+          </a:p>
+        </p:txBody>
+      </p:sp>
+      <p:cxnSp>
+        <p:nvCxnSpPr>
+          <p:cNvPr id="34" name="Curved Connector 33"/>
+          <p:cNvCxnSpPr>
+            <a:stCxn id="23" idx="2"/>
+            <a:endCxn id="31" idx="1"/>
+          </p:cNvCxnSpPr>
+          <p:nvPr>
+            <p:custDataLst>
+              <p:tags r:id="rId23"/>
+            </p:custDataLst>
+          </p:nvPr>
+        </p:nvCxnSpPr>
+        <p:spPr>
+          <a:xfrm rot="5400000" flipV="1">
+            <a:off x="6395085" y="2440940"/>
+            <a:ext cx="442595" cy="1325245"/>
+          </a:xfrm>
+          <a:prstGeom prst="curvedConnector2">
+            <a:avLst/>
+          </a:prstGeom>
+          <a:ln w="19050">
+            <a:solidFill>
+              <a:schemeClr val="tx1"/>
+            </a:solidFill>
+            <a:tailEnd type="arrow"/>
+          </a:ln>
+        </p:spPr>
+        <p:style>
+          <a:lnRef idx="2">
+            <a:schemeClr val="accent1"/>
+          </a:lnRef>
+          <a:fillRef idx="0">
+            <a:srgbClr val="FFFFFF"/>
+          </a:fillRef>
+          <a:effectRef idx="0">
+            <a:srgbClr val="FFFFFF"/>
+          </a:effectRef>
+          <a:fontRef idx="minor">
+            <a:schemeClr val="tx1"/>
+          </a:fontRef>
+        </p:style>
+      </p:cxnSp>
+      <p:sp>
+        <p:nvSpPr>
+          <p:cNvPr id="35" name="Text Box 34"/>
+          <p:cNvSpPr txBox="1"/>
+          <p:nvPr>
+            <p:custDataLst>
+              <p:tags r:id="rId24"/>
+            </p:custDataLst>
+          </p:nvPr>
+        </p:nvSpPr>
+        <p:spPr>
+          <a:xfrm>
+            <a:off x="6303010" y="2823210"/>
+            <a:ext cx="1475740" cy="332105"/>
+          </a:xfrm>
+          <a:prstGeom prst="rect">
+            <a:avLst/>
+          </a:prstGeom>
+          <a:noFill/>
+        </p:spPr>
+        <p:txBody>
+          <a:bodyPr wrap="square" rtlCol="0">
+            <a:noAutofit/>
+          </a:bodyPr>
+          <a:p>
+            <a:pPr algn="ctr"/>
+            <a:r>
+              <a:rPr lang="en-US" sz="1400" b="1">
+                <a:solidFill>
+                  <a:schemeClr val="tx1">
+                    <a:lumMod val="75000"/>
+                    <a:lumOff val="25000"/>
+                  </a:schemeClr>
+                </a:solidFill>
+              </a:rPr>
+              <a:t>randomization</a:t>
+            </a:r>
+            <a:endParaRPr lang="en-US" sz="1400" b="1">
+              <a:solidFill>
+                <a:schemeClr val="tx1">
+                  <a:lumMod val="75000"/>
+                  <a:lumOff val="25000"/>
+                </a:schemeClr>
+              </a:solidFill>
+            </a:endParaRPr>
+          </a:p>
+        </p:txBody>
+      </p:sp>
+      <p:sp>
+        <p:nvSpPr>
+          <p:cNvPr id="21" name="Text Box 20"/>
+          <p:cNvSpPr txBox="1"/>
+          <p:nvPr/>
+        </p:nvSpPr>
+        <p:spPr>
+          <a:xfrm>
+            <a:off x="8425815" y="3135630"/>
+            <a:ext cx="1367155" cy="332105"/>
+          </a:xfrm>
+          <a:prstGeom prst="rect">
+            <a:avLst/>
+          </a:prstGeom>
+          <a:noFill/>
+        </p:spPr>
+        <p:txBody>
+          <a:bodyPr wrap="square" rtlCol="0">
+            <a:noAutofit/>
+          </a:bodyPr>
+          <a:p>
+            <a:pPr algn="ctr"/>
+            <a:r>
+              <a:rPr lang="en-US" sz="1400" b="1">
+                <a:solidFill>
+                  <a:schemeClr val="tx1">
+                    <a:lumMod val="85000"/>
+                    <a:lumOff val="15000"/>
+                  </a:schemeClr>
+                </a:solidFill>
+              </a:rPr>
+              <a:t>flatten to tensor</a:t>
+            </a:r>
+            <a:endParaRPr lang="en-US" sz="1400" b="1">
+              <a:solidFill>
+                <a:schemeClr val="tx1">
+                  <a:lumMod val="85000"/>
+                  <a:lumOff val="15000"/>
+                </a:schemeClr>
+              </a:solidFill>
+            </a:endParaRPr>
+          </a:p>
+        </p:txBody>
+      </p:sp>
+      <p:sp>
+        <p:nvSpPr>
+          <p:cNvPr id="36" name="Rounded Rectangle 35"/>
+          <p:cNvSpPr/>
+          <p:nvPr>
+            <p:custDataLst>
+              <p:tags r:id="rId25"/>
+            </p:custDataLst>
+          </p:nvPr>
+        </p:nvSpPr>
+        <p:spPr>
+          <a:xfrm>
+            <a:off x="5123815" y="5042535"/>
+            <a:ext cx="1660525" cy="427355"/>
+          </a:xfrm>
+          <a:prstGeom prst="roundRect">
+            <a:avLst/>
+          </a:prstGeom>
+          <a:solidFill>
+            <a:schemeClr val="accent6">
+              <a:lumMod val="60000"/>
+              <a:lumOff val="40000"/>
+            </a:schemeClr>
+          </a:solidFill>
+        </p:spPr>
+        <p:style>
+          <a:lnRef idx="2">
+            <a:schemeClr val="accent1">
+              <a:lumMod val="75000"/>
+            </a:schemeClr>
+          </a:lnRef>
+          <a:fillRef idx="1">
+            <a:schemeClr val="accent1"/>
+          </a:fillRef>
+          <a:effectRef idx="0">
+            <a:srgbClr val="FFFFFF"/>
+          </a:effectRef>
+          <a:fontRef idx="minor">
+            <a:schemeClr val="lt1"/>
+          </a:fontRef>
+        </p:style>
+        <p:txBody>
+          <a:bodyPr rtlCol="0" anchor="ctr"/>
+          <a:p>
+            <a:pPr algn="ctr"/>
+            <a:r>
+              <a:rPr lang="en-US" altLang="zh-CN"/>
+              <a:t>_query_hook()</a:t>
+            </a:r>
+            <a:endParaRPr lang="en-US" altLang="zh-CN"/>
+          </a:p>
+        </p:txBody>
+      </p:sp>
+      <p:sp>
+        <p:nvSpPr>
+          <p:cNvPr id="37" name="Text Box 36"/>
+          <p:cNvSpPr txBox="1"/>
+          <p:nvPr>
+            <p:custDataLst>
+              <p:tags r:id="rId26"/>
+            </p:custDataLst>
+          </p:nvPr>
+        </p:nvSpPr>
+        <p:spPr>
+          <a:xfrm>
+            <a:off x="6303010" y="3308350"/>
+            <a:ext cx="1475740" cy="332105"/>
+          </a:xfrm>
+          <a:prstGeom prst="rect">
+            <a:avLst/>
+          </a:prstGeom>
+          <a:noFill/>
+        </p:spPr>
+        <p:txBody>
+          <a:bodyPr wrap="square" rtlCol="0">
+            <a:noAutofit/>
+          </a:bodyPr>
+          <a:p>
+            <a:pPr algn="ctr"/>
+            <a:r>
+              <a:rPr lang="en-US" sz="1400" b="1">
+                <a:solidFill>
+                  <a:schemeClr val="tx1">
+                    <a:lumMod val="75000"/>
+                    <a:lumOff val="25000"/>
+                  </a:schemeClr>
+                </a:solidFill>
+              </a:rPr>
+              <a:t>hook</a:t>
+            </a:r>
+            <a:endParaRPr lang="en-US" sz="1400" b="1">
+              <a:solidFill>
+                <a:schemeClr val="tx1">
+                  <a:lumMod val="75000"/>
+                  <a:lumOff val="25000"/>
+                </a:schemeClr>
+              </a:solidFill>
+            </a:endParaRPr>
+          </a:p>
+        </p:txBody>
+      </p:sp>
+      <p:cxnSp>
+        <p:nvCxnSpPr>
+          <p:cNvPr id="38" name="Curved Connector 37"/>
+          <p:cNvCxnSpPr>
+            <a:stCxn id="19" idx="2"/>
+            <a:endCxn id="36" idx="1"/>
+          </p:cNvCxnSpPr>
+          <p:nvPr>
+            <p:custDataLst>
+              <p:tags r:id="rId27"/>
+            </p:custDataLst>
+          </p:nvPr>
+        </p:nvCxnSpPr>
+        <p:spPr>
+          <a:xfrm rot="5400000" flipV="1">
+            <a:off x="3839210" y="3971925"/>
+            <a:ext cx="1050290" cy="1518285"/>
+          </a:xfrm>
+          <a:prstGeom prst="curvedConnector2">
+            <a:avLst/>
+          </a:prstGeom>
+          <a:ln w="19050">
+            <a:solidFill>
+              <a:schemeClr val="tx1"/>
+            </a:solidFill>
+            <a:tailEnd type="arrow"/>
+          </a:ln>
+        </p:spPr>
+        <p:style>
+          <a:lnRef idx="2">
+            <a:schemeClr val="accent1"/>
+          </a:lnRef>
+          <a:fillRef idx="0">
+            <a:srgbClr val="FFFFFF"/>
+          </a:fillRef>
+          <a:effectRef idx="0">
+            <a:srgbClr val="FFFFFF"/>
+          </a:effectRef>
+          <a:fontRef idx="minor">
+            <a:schemeClr val="tx1"/>
+          </a:fontRef>
+        </p:style>
+      </p:cxnSp>
+      <p:sp>
+        <p:nvSpPr>
+          <p:cNvPr id="39" name="Text Box 38"/>
+          <p:cNvSpPr txBox="1"/>
+          <p:nvPr>
+            <p:custDataLst>
+              <p:tags r:id="rId28"/>
+            </p:custDataLst>
+          </p:nvPr>
+        </p:nvSpPr>
+        <p:spPr>
+          <a:xfrm>
+            <a:off x="3521075" y="5042535"/>
+            <a:ext cx="1475740" cy="332105"/>
+          </a:xfrm>
+          <a:prstGeom prst="rect">
+            <a:avLst/>
+          </a:prstGeom>
+          <a:noFill/>
+        </p:spPr>
+        <p:txBody>
+          <a:bodyPr wrap="square" rtlCol="0">
+            <a:noAutofit/>
+          </a:bodyPr>
+          <a:p>
+            <a:pPr algn="ctr"/>
+            <a:r>
+              <a:rPr lang="en-US" sz="1400" b="1">
+                <a:solidFill>
+                  <a:schemeClr val="tx1">
+                    <a:lumMod val="75000"/>
+                    <a:lumOff val="25000"/>
+                  </a:schemeClr>
+                </a:solidFill>
+              </a:rPr>
+              <a:t>hook</a:t>
+            </a:r>
+            <a:endParaRPr lang="en-US" sz="1400" b="1">
+              <a:solidFill>
+                <a:schemeClr val="tx1">
+                  <a:lumMod val="75000"/>
+                  <a:lumOff val="25000"/>
+                </a:schemeClr>
+              </a:solidFill>
+            </a:endParaRPr>
           </a:p>
         </p:txBody>
       </p:sp>
@@ -8674,12 +10172,108 @@
 </p:tagLst>
 </file>
 
+<file path=ppt/tags/tag100.xml><?xml version="1.0" encoding="utf-8"?>
+<p:tagLst xmlns:p="http://schemas.openxmlformats.org/presentationml/2006/main">
+  <p:tag name="KSO_WM_BEAUTIFY_FLAG" val=""/>
+</p:tagLst>
+</file>
+
+<file path=ppt/tags/tag101.xml><?xml version="1.0" encoding="utf-8"?>
+<p:tagLst xmlns:p="http://schemas.openxmlformats.org/presentationml/2006/main">
+  <p:tag name="KSO_WM_BEAUTIFY_FLAG" val=""/>
+</p:tagLst>
+</file>
+
+<file path=ppt/tags/tag102.xml><?xml version="1.0" encoding="utf-8"?>
+<p:tagLst xmlns:p="http://schemas.openxmlformats.org/presentationml/2006/main">
+  <p:tag name="KSO_WM_BEAUTIFY_FLAG" val=""/>
+</p:tagLst>
+</file>
+
+<file path=ppt/tags/tag103.xml><?xml version="1.0" encoding="utf-8"?>
+<p:tagLst xmlns:p="http://schemas.openxmlformats.org/presentationml/2006/main">
+  <p:tag name="KSO_WM_BEAUTIFY_FLAG" val=""/>
+</p:tagLst>
+</file>
+
+<file path=ppt/tags/tag104.xml><?xml version="1.0" encoding="utf-8"?>
+<p:tagLst xmlns:p="http://schemas.openxmlformats.org/presentationml/2006/main">
+  <p:tag name="KSO_WM_BEAUTIFY_FLAG" val=""/>
+</p:tagLst>
+</file>
+
+<file path=ppt/tags/tag105.xml><?xml version="1.0" encoding="utf-8"?>
+<p:tagLst xmlns:p="http://schemas.openxmlformats.org/presentationml/2006/main">
+  <p:tag name="KSO_WM_BEAUTIFY_FLAG" val=""/>
+</p:tagLst>
+</file>
+
+<file path=ppt/tags/tag106.xml><?xml version="1.0" encoding="utf-8"?>
+<p:tagLst xmlns:p="http://schemas.openxmlformats.org/presentationml/2006/main">
+  <p:tag name="KSO_WM_BEAUTIFY_FLAG" val=""/>
+</p:tagLst>
+</file>
+
+<file path=ppt/tags/tag107.xml><?xml version="1.0" encoding="utf-8"?>
+<p:tagLst xmlns:p="http://schemas.openxmlformats.org/presentationml/2006/main">
+  <p:tag name="KSO_WM_BEAUTIFY_FLAG" val=""/>
+</p:tagLst>
+</file>
+
+<file path=ppt/tags/tag108.xml><?xml version="1.0" encoding="utf-8"?>
+<p:tagLst xmlns:p="http://schemas.openxmlformats.org/presentationml/2006/main">
+  <p:tag name="KSO_WM_BEAUTIFY_FLAG" val=""/>
+</p:tagLst>
+</file>
+
+<file path=ppt/tags/tag109.xml><?xml version="1.0" encoding="utf-8"?>
+<p:tagLst xmlns:p="http://schemas.openxmlformats.org/presentationml/2006/main">
+  <p:tag name="KSO_WM_BEAUTIFY_FLAG" val=""/>
+</p:tagLst>
+</file>
+
 <file path=ppt/tags/tag11.xml><?xml version="1.0" encoding="utf-8"?>
 <p:tagLst xmlns:p="http://schemas.openxmlformats.org/presentationml/2006/main">
   <p:tag name="KSO_WM_BEAUTIFY_FLAG" val=""/>
 </p:tagLst>
 </file>
 
+<file path=ppt/tags/tag110.xml><?xml version="1.0" encoding="utf-8"?>
+<p:tagLst xmlns:p="http://schemas.openxmlformats.org/presentationml/2006/main">
+  <p:tag name="KSO_WM_BEAUTIFY_FLAG" val=""/>
+</p:tagLst>
+</file>
+
+<file path=ppt/tags/tag111.xml><?xml version="1.0" encoding="utf-8"?>
+<p:tagLst xmlns:p="http://schemas.openxmlformats.org/presentationml/2006/main">
+  <p:tag name="KSO_WM_BEAUTIFY_FLAG" val=""/>
+</p:tagLst>
+</file>
+
+<file path=ppt/tags/tag112.xml><?xml version="1.0" encoding="utf-8"?>
+<p:tagLst xmlns:p="http://schemas.openxmlformats.org/presentationml/2006/main">
+  <p:tag name="KSO_WM_BEAUTIFY_FLAG" val=""/>
+</p:tagLst>
+</file>
+
+<file path=ppt/tags/tag113.xml><?xml version="1.0" encoding="utf-8"?>
+<p:tagLst xmlns:p="http://schemas.openxmlformats.org/presentationml/2006/main">
+  <p:tag name="KSO_WM_BEAUTIFY_FLAG" val=""/>
+</p:tagLst>
+</file>
+
+<file path=ppt/tags/tag114.xml><?xml version="1.0" encoding="utf-8"?>
+<p:tagLst xmlns:p="http://schemas.openxmlformats.org/presentationml/2006/main">
+  <p:tag name="KSO_WM_BEAUTIFY_FLAG" val=""/>
+</p:tagLst>
+</file>
+
+<file path=ppt/tags/tag115.xml><?xml version="1.0" encoding="utf-8"?>
+<p:tagLst xmlns:p="http://schemas.openxmlformats.org/presentationml/2006/main">
+  <p:tag name="KSO_WM_BEAUTIFY_FLAG" val=""/>
+</p:tagLst>
+</file>
+
 <file path=ppt/tags/tag12.xml><?xml version="1.0" encoding="utf-8"?>
 <p:tagLst xmlns:p="http://schemas.openxmlformats.org/presentationml/2006/main">
   <p:tag name="KSO_WM_BEAUTIFY_FLAG" val=""/>
@@ -9178,7 +10772,79 @@
 </p:tagLst>
 </file>
 
+<file path=ppt/tags/tag88.xml><?xml version="1.0" encoding="utf-8"?>
+<p:tagLst xmlns:p="http://schemas.openxmlformats.org/presentationml/2006/main">
+  <p:tag name="KSO_WM_BEAUTIFY_FLAG" val=""/>
+</p:tagLst>
+</file>
+
+<file path=ppt/tags/tag89.xml><?xml version="1.0" encoding="utf-8"?>
+<p:tagLst xmlns:p="http://schemas.openxmlformats.org/presentationml/2006/main">
+  <p:tag name="KSO_WM_BEAUTIFY_FLAG" val=""/>
+</p:tagLst>
+</file>
+
 <file path=ppt/tags/tag9.xml><?xml version="1.0" encoding="utf-8"?>
+<p:tagLst xmlns:p="http://schemas.openxmlformats.org/presentationml/2006/main">
+  <p:tag name="KSO_WM_BEAUTIFY_FLAG" val=""/>
+</p:tagLst>
+</file>
+
+<file path=ppt/tags/tag90.xml><?xml version="1.0" encoding="utf-8"?>
+<p:tagLst xmlns:p="http://schemas.openxmlformats.org/presentationml/2006/main">
+  <p:tag name="KSO_WM_BEAUTIFY_FLAG" val=""/>
+</p:tagLst>
+</file>
+
+<file path=ppt/tags/tag91.xml><?xml version="1.0" encoding="utf-8"?>
+<p:tagLst xmlns:p="http://schemas.openxmlformats.org/presentationml/2006/main">
+  <p:tag name="KSO_WM_BEAUTIFY_FLAG" val=""/>
+</p:tagLst>
+</file>
+
+<file path=ppt/tags/tag92.xml><?xml version="1.0" encoding="utf-8"?>
+<p:tagLst xmlns:p="http://schemas.openxmlformats.org/presentationml/2006/main">
+  <p:tag name="KSO_WM_BEAUTIFY_FLAG" val=""/>
+</p:tagLst>
+</file>
+
+<file path=ppt/tags/tag93.xml><?xml version="1.0" encoding="utf-8"?>
+<p:tagLst xmlns:p="http://schemas.openxmlformats.org/presentationml/2006/main">
+  <p:tag name="KSO_WM_BEAUTIFY_FLAG" val=""/>
+</p:tagLst>
+</file>
+
+<file path=ppt/tags/tag94.xml><?xml version="1.0" encoding="utf-8"?>
+<p:tagLst xmlns:p="http://schemas.openxmlformats.org/presentationml/2006/main">
+  <p:tag name="KSO_WM_BEAUTIFY_FLAG" val=""/>
+</p:tagLst>
+</file>
+
+<file path=ppt/tags/tag95.xml><?xml version="1.0" encoding="utf-8"?>
+<p:tagLst xmlns:p="http://schemas.openxmlformats.org/presentationml/2006/main">
+  <p:tag name="KSO_WM_BEAUTIFY_FLAG" val=""/>
+</p:tagLst>
+</file>
+
+<file path=ppt/tags/tag96.xml><?xml version="1.0" encoding="utf-8"?>
+<p:tagLst xmlns:p="http://schemas.openxmlformats.org/presentationml/2006/main">
+  <p:tag name="KSO_WM_BEAUTIFY_FLAG" val=""/>
+</p:tagLst>
+</file>
+
+<file path=ppt/tags/tag97.xml><?xml version="1.0" encoding="utf-8"?>
+<p:tagLst xmlns:p="http://schemas.openxmlformats.org/presentationml/2006/main">
+  <p:tag name="KSO_WM_BEAUTIFY_FLAG" val=""/>
+</p:tagLst>
+</file>
+
+<file path=ppt/tags/tag98.xml><?xml version="1.0" encoding="utf-8"?>
+<p:tagLst xmlns:p="http://schemas.openxmlformats.org/presentationml/2006/main">
+  <p:tag name="KSO_WM_BEAUTIFY_FLAG" val=""/>
+</p:tagLst>
+</file>
+
+<file path=ppt/tags/tag99.xml><?xml version="1.0" encoding="utf-8"?>
 <p:tagLst xmlns:p="http://schemas.openxmlformats.org/presentationml/2006/main">
   <p:tag name="KSO_WM_BEAUTIFY_FLAG" val=""/>
 </p:tagLst>

</xml_diff>